<commit_message>
Add new functionalities in power point.
</commit_message>
<xml_diff>
--- a/Specifications.pptx
+++ b/Specifications.pptx
@@ -519,7 +519,7 @@
             <a:fld id="{450B2359-2FB6-4813-BCCF-53F3748D72DB}" type="datetimeFigureOut">
               <a:rPr lang="en-GB" smtClean="0"/>
               <a:pPr/>
-              <a:t>10/02/2015</a:t>
+              <a:t>20/02/2015</a:t>
             </a:fld>
             <a:endParaRPr lang="en-GB" dirty="0"/>
           </a:p>
@@ -4351,7 +4351,7 @@
                 <a:cs typeface="Arial" pitchFamily="34" charset="0"/>
               </a:rPr>
               <a:pPr/>
-              <a:t>10/02/2015</a:t>
+              <a:t>20/02/2015</a:t>
             </a:fld>
             <a:r>
               <a:rPr lang="en-GB" sz="800" dirty="0" smtClean="0">
@@ -5207,11 +5207,7 @@
           <a:p>
             <a:r>
               <a:rPr lang="en-GB" dirty="0" smtClean="0"/>
-              <a:t>VS </a:t>
-            </a:r>
-            <a:r>
-              <a:rPr lang="en-GB" dirty="0" smtClean="0"/>
-              <a:t>Clip</a:t>
+              <a:t>VS Clip</a:t>
             </a:r>
           </a:p>
           <a:p>
@@ -5398,35 +5394,63 @@
           <a:lstStyle/>
           <a:p>
             <a:r>
-              <a:rPr lang="en-GB" dirty="0" smtClean="0"/>
+              <a:rPr lang="en-GB" dirty="0" smtClean="0">
+                <a:solidFill>
+                  <a:schemeClr val="accent6"/>
+                </a:solidFill>
+              </a:rPr>
               <a:t>To see a variable use CTRL+C shortcut</a:t>
             </a:r>
           </a:p>
           <a:p>
             <a:r>
-              <a:rPr lang="en-GB" dirty="0" smtClean="0"/>
+              <a:rPr lang="en-GB" dirty="0" smtClean="0">
+                <a:solidFill>
+                  <a:schemeClr val="accent6"/>
+                </a:solidFill>
+              </a:rPr>
               <a:t>If there aren’t variables or more than N (number defined) results, then the popup will display a message to notify the users.</a:t>
             </a:r>
           </a:p>
           <a:p>
             <a:r>
-              <a:rPr lang="en-GB" dirty="0" smtClean="0"/>
+              <a:rPr lang="en-GB" dirty="0" smtClean="0">
+                <a:solidFill>
+                  <a:schemeClr val="accent6"/>
+                </a:solidFill>
+              </a:rPr>
               <a:t>If </a:t>
             </a:r>
             <a:r>
-              <a:rPr lang="en-GB" dirty="0"/>
+              <a:rPr lang="en-GB" dirty="0">
+                <a:solidFill>
+                  <a:schemeClr val="accent6"/>
+                </a:solidFill>
+              </a:rPr>
               <a:t>a variable </a:t>
             </a:r>
             <a:r>
-              <a:rPr lang="en-GB" dirty="0" smtClean="0"/>
+              <a:rPr lang="en-GB" dirty="0" smtClean="0">
+                <a:solidFill>
+                  <a:schemeClr val="accent6"/>
+                </a:solidFill>
+              </a:rPr>
               <a:t>matches, the </a:t>
             </a:r>
             <a:r>
-              <a:rPr lang="en-GB" dirty="0"/>
+              <a:rPr lang="en-GB" dirty="0">
+                <a:solidFill>
+                  <a:schemeClr val="accent6"/>
+                </a:solidFill>
+              </a:rPr>
               <a:t>different variables will be shown with their </a:t>
             </a:r>
             <a:r>
-              <a:rPr lang="en-GB" dirty="0" smtClean="0"/>
+              <a:rPr lang="en-GB" dirty="0" smtClean="0">
+                <a:solidFill>
+                  <a:schemeClr val="accent6"/>
+                </a:solidFill>
+              </a:rPr>
               <a:t>values in a popup</a:t>
             </a:r>
           </a:p>
@@ -5456,7 +5480,11 @@
           </a:p>
           <a:p>
             <a:r>
-              <a:rPr lang="en-GB" dirty="0" smtClean="0"/>
+              <a:rPr lang="en-GB" dirty="0" smtClean="0">
+                <a:solidFill>
+                  <a:schemeClr val="accent6"/>
+                </a:solidFill>
+              </a:rPr>
               <a:t>Possibility to edit copied variable </a:t>
             </a:r>
           </a:p>
@@ -5468,7 +5496,11 @@
           </a:p>
           <a:p>
             <a:r>
-              <a:rPr lang="en-GB" dirty="0" smtClean="0"/>
+              <a:rPr lang="en-GB" dirty="0" smtClean="0">
+                <a:solidFill>
+                  <a:schemeClr val="accent6"/>
+                </a:solidFill>
+              </a:rPr>
               <a:t>Refresh button for exhaustive VS variable list</a:t>
             </a:r>
           </a:p>
@@ -5863,9 +5895,66 @@
           </a:p>
           <a:p>
             <a:r>
-              <a:rPr lang="en-GB" dirty="0" smtClean="0"/>
-              <a:t>Automated refresh of VS variable</a:t>
-            </a:r>
+              <a:rPr lang="en-GB" dirty="0" smtClean="0">
+                <a:solidFill>
+                  <a:schemeClr val="accent6"/>
+                </a:solidFill>
+              </a:rPr>
+              <a:t>Automated refresh of VS </a:t>
+            </a:r>
+            <a:r>
+              <a:rPr lang="en-GB" dirty="0" smtClean="0">
+                <a:solidFill>
+                  <a:schemeClr val="accent6"/>
+                </a:solidFill>
+              </a:rPr>
+              <a:t>variable</a:t>
+            </a:r>
+          </a:p>
+          <a:p>
+            <a:r>
+              <a:rPr lang="en-GB" dirty="0" smtClean="0">
+                <a:solidFill>
+                  <a:schemeClr val="accent6"/>
+                </a:solidFill>
+              </a:rPr>
+              <a:t>A colour appears when the variable value has changed for N seconds</a:t>
+            </a:r>
+          </a:p>
+          <a:p>
+            <a:r>
+              <a:rPr lang="en-GB" dirty="0" smtClean="0">
+                <a:solidFill>
+                  <a:schemeClr val="accent6"/>
+                </a:solidFill>
+              </a:rPr>
+              <a:t>The search text is filtered (avoid having special characters like %,*;….)</a:t>
+            </a:r>
+          </a:p>
+          <a:p>
+            <a:r>
+              <a:rPr lang="en-GB" dirty="0" smtClean="0">
+                <a:solidFill>
+                  <a:schemeClr val="accent6"/>
+                </a:solidFill>
+              </a:rPr>
+              <a:t>Information message displays the reason why there isn’t the search</a:t>
+            </a:r>
+          </a:p>
+          <a:p>
+            <a:r>
+              <a:rPr lang="en-GB" dirty="0" smtClean="0">
+                <a:solidFill>
+                  <a:schemeClr val="accent6"/>
+                </a:solidFill>
+              </a:rPr>
+              <a:t>File configuration to put the personal value, on refresh rate, the colour when a variable value changed and the duration that the colour stays on.</a:t>
+            </a:r>
+            <a:endParaRPr lang="en-GB" dirty="0" smtClean="0">
+              <a:solidFill>
+                <a:schemeClr val="accent6"/>
+              </a:solidFill>
+            </a:endParaRPr>
           </a:p>
           <a:p>
             <a:endParaRPr lang="en-GB" dirty="0"/>

</xml_diff>